<commit_message>
Moving over the eclipse package
Moved over the eclipse package and created files from the program.
</commit_message>
<xml_diff>
--- a/TwitterStreamPresentation.pptx
+++ b/TwitterStreamPresentation.pptx
@@ -309,7 +309,7 @@
           <a:p>
             <a:fld id="{4AAD347D-5ACD-4C99-B74B-A9C85AD731AF}" type="datetimeFigureOut">
               <a:rPr lang="en-US" dirty="0"/>
-              <a:t>12/18/2018</a:t>
+              <a:t>12/19/2018</a:t>
             </a:fld>
             <a:endParaRPr lang="en-US" dirty="0"/>
           </a:p>
@@ -579,7 +579,7 @@
           <a:p>
             <a:fld id="{4509A250-FF31-4206-8172-F9D3106AACB1}" type="datetimeFigureOut">
               <a:rPr lang="en-US" dirty="0"/>
-              <a:t>12/18/2018</a:t>
+              <a:t>12/19/2018</a:t>
             </a:fld>
             <a:endParaRPr lang="en-US" dirty="0"/>
           </a:p>
@@ -768,7 +768,7 @@
           <a:p>
             <a:fld id="{4509A250-FF31-4206-8172-F9D3106AACB1}" type="datetimeFigureOut">
               <a:rPr lang="en-US" dirty="0"/>
-              <a:t>12/18/2018</a:t>
+              <a:t>12/19/2018</a:t>
             </a:fld>
             <a:endParaRPr lang="en-US" dirty="0"/>
           </a:p>
@@ -1036,7 +1036,7 @@
           <a:p>
             <a:fld id="{4509A250-FF31-4206-8172-F9D3106AACB1}" type="datetimeFigureOut">
               <a:rPr lang="en-US" dirty="0"/>
-              <a:t>12/18/2018</a:t>
+              <a:t>12/19/2018</a:t>
             </a:fld>
             <a:endParaRPr lang="en-US" dirty="0"/>
           </a:p>
@@ -1372,7 +1372,7 @@
           <a:p>
             <a:fld id="{4509A250-FF31-4206-8172-F9D3106AACB1}" type="datetimeFigureOut">
               <a:rPr lang="en-US" dirty="0"/>
-              <a:t>12/18/2018</a:t>
+              <a:t>12/19/2018</a:t>
             </a:fld>
             <a:endParaRPr lang="en-US" dirty="0"/>
           </a:p>
@@ -1990,7 +1990,7 @@
           <a:p>
             <a:fld id="{4509A250-FF31-4206-8172-F9D3106AACB1}" type="datetimeFigureOut">
               <a:rPr lang="en-US" dirty="0"/>
-              <a:t>12/18/2018</a:t>
+              <a:t>12/19/2018</a:t>
             </a:fld>
             <a:endParaRPr lang="en-US" dirty="0"/>
           </a:p>
@@ -2845,7 +2845,7 @@
           <a:p>
             <a:fld id="{4509A250-FF31-4206-8172-F9D3106AACB1}" type="datetimeFigureOut">
               <a:rPr lang="en-US" dirty="0"/>
-              <a:t>12/18/2018</a:t>
+              <a:t>12/19/2018</a:t>
             </a:fld>
             <a:endParaRPr lang="en-US" dirty="0"/>
           </a:p>
@@ -3010,7 +3010,7 @@
           <a:p>
             <a:fld id="{4509A250-FF31-4206-8172-F9D3106AACB1}" type="datetimeFigureOut">
               <a:rPr lang="en-US" dirty="0"/>
-              <a:t>12/18/2018</a:t>
+              <a:t>12/19/2018</a:t>
             </a:fld>
             <a:endParaRPr lang="en-US" dirty="0"/>
           </a:p>
@@ -3185,7 +3185,7 @@
           <a:p>
             <a:fld id="{4509A250-FF31-4206-8172-F9D3106AACB1}" type="datetimeFigureOut">
               <a:rPr lang="en-US" dirty="0"/>
-              <a:t>12/18/2018</a:t>
+              <a:t>12/19/2018</a:t>
             </a:fld>
             <a:endParaRPr lang="en-US" dirty="0"/>
           </a:p>
@@ -3350,7 +3350,7 @@
           <a:p>
             <a:fld id="{4509A250-FF31-4206-8172-F9D3106AACB1}" type="datetimeFigureOut">
               <a:rPr lang="en-US" dirty="0"/>
-              <a:t>12/18/2018</a:t>
+              <a:t>12/19/2018</a:t>
             </a:fld>
             <a:endParaRPr lang="en-US" dirty="0"/>
           </a:p>
@@ -3592,7 +3592,7 @@
           <a:p>
             <a:fld id="{9796027F-7875-4030-9381-8BD8C4F21935}" type="datetimeFigureOut">
               <a:rPr lang="en-US" dirty="0"/>
-              <a:t>12/18/2018</a:t>
+              <a:t>12/19/2018</a:t>
             </a:fld>
             <a:endParaRPr lang="en-US" dirty="0"/>
           </a:p>
@@ -3879,7 +3879,7 @@
           <a:p>
             <a:fld id="{9796027F-7875-4030-9381-8BD8C4F21935}" type="datetimeFigureOut">
               <a:rPr lang="en-US" dirty="0"/>
-              <a:t>12/18/2018</a:t>
+              <a:t>12/19/2018</a:t>
             </a:fld>
             <a:endParaRPr lang="en-US" dirty="0"/>
           </a:p>
@@ -4318,7 +4318,7 @@
           <a:p>
             <a:fld id="{9796027F-7875-4030-9381-8BD8C4F21935}" type="datetimeFigureOut">
               <a:rPr lang="en-US" dirty="0"/>
-              <a:t>12/18/2018</a:t>
+              <a:t>12/19/2018</a:t>
             </a:fld>
             <a:endParaRPr lang="en-US" dirty="0"/>
           </a:p>
@@ -4431,7 +4431,7 @@
           <a:p>
             <a:fld id="{4509A250-FF31-4206-8172-F9D3106AACB1}" type="datetimeFigureOut">
               <a:rPr lang="en-US" dirty="0"/>
-              <a:t>12/18/2018</a:t>
+              <a:t>12/19/2018</a:t>
             </a:fld>
             <a:endParaRPr lang="en-US" dirty="0"/>
           </a:p>
@@ -4521,7 +4521,7 @@
           <a:p>
             <a:fld id="{4509A250-FF31-4206-8172-F9D3106AACB1}" type="datetimeFigureOut">
               <a:rPr lang="en-US" dirty="0"/>
-              <a:t>12/18/2018</a:t>
+              <a:t>12/19/2018</a:t>
             </a:fld>
             <a:endParaRPr lang="en-US" dirty="0"/>
           </a:p>
@@ -4795,7 +4795,7 @@
           <a:p>
             <a:fld id="{4509A250-FF31-4206-8172-F9D3106AACB1}" type="datetimeFigureOut">
               <a:rPr lang="en-US" dirty="0"/>
-              <a:t>12/18/2018</a:t>
+              <a:t>12/19/2018</a:t>
             </a:fld>
             <a:endParaRPr lang="en-US" dirty="0"/>
           </a:p>
@@ -5065,7 +5065,7 @@
           <a:p>
             <a:fld id="{4509A250-FF31-4206-8172-F9D3106AACB1}" type="datetimeFigureOut">
               <a:rPr lang="en-US" dirty="0"/>
-              <a:t>12/18/2018</a:t>
+              <a:t>12/19/2018</a:t>
             </a:fld>
             <a:endParaRPr lang="en-US" dirty="0"/>
           </a:p>
@@ -5489,7 +5489,7 @@
           <a:p>
             <a:fld id="{4AAD347D-5ACD-4C99-B74B-A9C85AD731AF}" type="datetimeFigureOut">
               <a:rPr lang="en-US" dirty="0"/>
-              <a:t>12/18/2018</a:t>
+              <a:t>12/19/2018</a:t>
             </a:fld>
             <a:endParaRPr lang="en-US" dirty="0"/>
           </a:p>
@@ -6907,11 +6907,7 @@
             <a:pPr lvl="1"/>
             <a:r>
               <a:rPr lang="en-US" dirty="0" smtClean="0"/>
-              <a:t>You w</a:t>
-            </a:r>
-            <a:r>
-              <a:rPr lang="en-US" dirty="0" smtClean="0"/>
-              <a:t>ill </a:t>
+              <a:t>You will </a:t>
             </a:r>
             <a:r>
               <a:rPr lang="en-US" dirty="0"/>
@@ -7261,25 +7257,68 @@
             </a:r>
             <a:r>
               <a:rPr lang="en-US" dirty="0" smtClean="0"/>
-              <a:t>example for getting:</a:t>
+              <a:t>example for getting</a:t>
+            </a:r>
+            <a:r>
+              <a:rPr lang="en-US" dirty="0" smtClean="0"/>
+              <a:t>:</a:t>
             </a:r>
           </a:p>
           <a:p>
             <a:pPr lvl="1"/>
             <a:r>
               <a:rPr lang="en-US" dirty="0" smtClean="0"/>
-              <a:t>Tweet Text</a:t>
+              <a:t>Tweet ID</a:t>
             </a:r>
           </a:p>
           <a:p>
             <a:pPr lvl="1"/>
             <a:r>
+              <a:rPr lang="en-US" dirty="0"/>
+              <a:t>Created </a:t>
+            </a:r>
+            <a:r>
               <a:rPr lang="en-US" dirty="0" smtClean="0"/>
-              <a:t>Created at Date</a:t>
-            </a:r>
+              <a:t>Date</a:t>
+            </a:r>
+            <a:endParaRPr lang="en-US" dirty="0"/>
           </a:p>
           <a:p>
             <a:pPr lvl="1"/>
+            <a:r>
+              <a:rPr lang="en-US" dirty="0"/>
+              <a:t>Tweet </a:t>
+            </a:r>
+            <a:r>
+              <a:rPr lang="en-US" dirty="0" smtClean="0"/>
+              <a:t>Text</a:t>
+            </a:r>
+          </a:p>
+          <a:p>
+            <a:pPr lvl="1"/>
+            <a:r>
+              <a:rPr lang="en-US" dirty="0"/>
+              <a:t>User ID</a:t>
+            </a:r>
+          </a:p>
+          <a:p>
+            <a:pPr lvl="1"/>
+            <a:r>
+              <a:rPr lang="en-US" dirty="0"/>
+              <a:t>*Language</a:t>
+            </a:r>
+            <a:r>
+              <a:rPr lang="en-US" dirty="0" smtClean="0"/>
+              <a:t>*</a:t>
+            </a:r>
+            <a:endParaRPr lang="en-US" dirty="0" smtClean="0"/>
+          </a:p>
+          <a:p>
+            <a:pPr lvl="1"/>
+            <a:r>
+              <a:rPr lang="en-US" dirty="0" smtClean="0"/>
+              <a:t>Hashtags</a:t>
+            </a:r>
             <a:endParaRPr lang="en-US" dirty="0"/>
           </a:p>
         </p:txBody>

</xml_diff>